<commit_message>
add solution for lecture 11 . excercise
</commit_message>
<xml_diff>
--- a/Lecture 11_One sample z and t test/Lecture 11_One sample z and t test.pptx
+++ b/Lecture 11_One sample z and t test/Lecture 11_One sample z and t test.pptx
@@ -5,10 +5,10 @@
     <p:sldMasterId id="2147483648" r:id="rId1"/>
   </p:sldMasterIdLst>
   <p:notesMasterIdLst>
-    <p:notesMasterId r:id="rId35"/>
+    <p:notesMasterId r:id="rId36"/>
   </p:notesMasterIdLst>
   <p:handoutMasterIdLst>
-    <p:handoutMasterId r:id="rId36"/>
+    <p:handoutMasterId r:id="rId37"/>
   </p:handoutMasterIdLst>
   <p:sldIdLst>
     <p:sldId id="257" r:id="rId2"/>
@@ -44,6 +44,7 @@
     <p:sldId id="358" r:id="rId32"/>
     <p:sldId id="363" r:id="rId33"/>
     <p:sldId id="364" r:id="rId34"/>
+    <p:sldId id="365" r:id="rId35"/>
   </p:sldIdLst>
   <p:sldSz cx="9144000" cy="6858000" type="screen4x3"/>
   <p:notesSz cx="7315200" cy="9601200"/>
@@ -144,7 +145,7 @@
   </p:defaultTextStyle>
   <p:extLst>
     <p:ext uri="{EFAFB233-063F-42B5-8137-9DF3F51BA10A}">
-      <p15:sldGuideLst xmlns="" xmlns:p15="http://schemas.microsoft.com/office/powerpoint/2012/main">
+      <p15:sldGuideLst xmlns:p15="http://schemas.microsoft.com/office/powerpoint/2012/main" xmlns="">
         <p15:guide id="1" orient="horz" pos="2160">
           <p15:clr>
             <a:srgbClr val="A4A3A4"/>
@@ -243,7 +244,7 @@
           <a:p>
             <a:fld id="{2F225ADF-1973-45D0-B098-EFD70C5FCD4A}" type="datetimeFigureOut">
               <a:rPr lang="en-US" smtClean="0"/>
-              <a:t>3/27/18</a:t>
+              <a:t>3/29/18</a:t>
             </a:fld>
             <a:endParaRPr lang="en-US"/>
           </a:p>
@@ -408,7 +409,7 @@
           <a:p>
             <a:fld id="{5E9C375F-44E0-4C70-A1D0-E408F9279719}" type="datetimeFigureOut">
               <a:rPr lang="en-US" smtClean="0"/>
-              <a:t>3/27/18</a:t>
+              <a:t>3/29/18</a:t>
             </a:fld>
             <a:endParaRPr lang="en-US"/>
           </a:p>
@@ -2960,7 +2961,7 @@
           <a:p>
             <a:fld id="{7E25D941-4F05-423F-B503-288D944D13BC}" type="datetime1">
               <a:rPr lang="en-US" smtClean="0"/>
-              <a:t>3/27/18</a:t>
+              <a:t>3/29/18</a:t>
             </a:fld>
             <a:endParaRPr lang="en-US"/>
           </a:p>
@@ -3128,7 +3129,7 @@
           <a:p>
             <a:fld id="{56A515D7-71B6-4E03-B63A-D9B88795245D}" type="datetime1">
               <a:rPr lang="en-US" smtClean="0"/>
-              <a:t>3/27/18</a:t>
+              <a:t>3/29/18</a:t>
             </a:fld>
             <a:endParaRPr lang="en-US"/>
           </a:p>
@@ -3306,7 +3307,7 @@
           <a:p>
             <a:fld id="{7232DBC7-C0CA-40A7-99AA-31183D09081D}" type="datetime1">
               <a:rPr lang="en-US" smtClean="0"/>
-              <a:t>3/27/18</a:t>
+              <a:t>3/29/18</a:t>
             </a:fld>
             <a:endParaRPr lang="en-US"/>
           </a:p>
@@ -3474,7 +3475,7 @@
           <a:p>
             <a:fld id="{399998D0-A6AB-4887-B07A-CF6E1DDA2703}" type="datetime1">
               <a:rPr lang="en-US" smtClean="0"/>
-              <a:t>3/27/18</a:t>
+              <a:t>3/29/18</a:t>
             </a:fld>
             <a:endParaRPr lang="en-US"/>
           </a:p>
@@ -3719,7 +3720,7 @@
           <a:p>
             <a:fld id="{922173D2-1272-44D9-B49B-825D4762EA62}" type="datetime1">
               <a:rPr lang="en-US" smtClean="0"/>
-              <a:t>3/27/18</a:t>
+              <a:t>3/29/18</a:t>
             </a:fld>
             <a:endParaRPr lang="en-US"/>
           </a:p>
@@ -4004,7 +4005,7 @@
           <a:p>
             <a:fld id="{3259848C-51A9-4C90-B6FD-3C2DD96750B4}" type="datetime1">
               <a:rPr lang="en-US" smtClean="0"/>
-              <a:t>3/27/18</a:t>
+              <a:t>3/29/18</a:t>
             </a:fld>
             <a:endParaRPr lang="en-US"/>
           </a:p>
@@ -4423,7 +4424,7 @@
           <a:p>
             <a:fld id="{918189BA-98A4-4604-80FA-83B7024F31BE}" type="datetime1">
               <a:rPr lang="en-US" smtClean="0"/>
-              <a:t>3/27/18</a:t>
+              <a:t>3/29/18</a:t>
             </a:fld>
             <a:endParaRPr lang="en-US"/>
           </a:p>
@@ -4540,7 +4541,7 @@
           <a:p>
             <a:fld id="{EE4D4051-58C7-44A6-8ECE-B67E45DF3127}" type="datetime1">
               <a:rPr lang="en-US" smtClean="0"/>
-              <a:t>3/27/18</a:t>
+              <a:t>3/29/18</a:t>
             </a:fld>
             <a:endParaRPr lang="en-US"/>
           </a:p>
@@ -4635,7 +4636,7 @@
           <a:p>
             <a:fld id="{305F9DAD-C4C3-427B-9DE2-CA7B5C8C3620}" type="datetime1">
               <a:rPr lang="en-US" smtClean="0"/>
-              <a:t>3/27/18</a:t>
+              <a:t>3/29/18</a:t>
             </a:fld>
             <a:endParaRPr lang="en-US"/>
           </a:p>
@@ -4910,7 +4911,7 @@
           <a:p>
             <a:fld id="{E4CC494D-D222-4836-8F8F-C1A04AC70EF6}" type="datetime1">
               <a:rPr lang="en-US" smtClean="0"/>
-              <a:t>3/27/18</a:t>
+              <a:t>3/29/18</a:t>
             </a:fld>
             <a:endParaRPr lang="en-US"/>
           </a:p>
@@ -5162,7 +5163,7 @@
           <a:p>
             <a:fld id="{58FE7012-F14C-4466-ABD3-BF421DEE6F07}" type="datetime1">
               <a:rPr lang="en-US" smtClean="0"/>
-              <a:t>3/27/18</a:t>
+              <a:t>3/29/18</a:t>
             </a:fld>
             <a:endParaRPr lang="en-US"/>
           </a:p>
@@ -5373,7 +5374,7 @@
           <a:p>
             <a:fld id="{A84EACA3-D797-466D-8DDC-DB9B5784A49C}" type="datetime1">
               <a:rPr lang="en-US" smtClean="0"/>
-              <a:t>3/27/18</a:t>
+              <a:t>3/29/18</a:t>
             </a:fld>
             <a:endParaRPr lang="en-US"/>
           </a:p>
@@ -6323,7 +6324,7 @@
           <a:graphicData uri="http://schemas.openxmlformats.org/presentationml/2006/ole">
             <mc:AlternateContent xmlns:mc="http://schemas.openxmlformats.org/markup-compatibility/2006">
               <mc:Choice xmlns:v="urn:schemas-microsoft-com:vml" Requires="v">
-                <p:oleObj spid="_x0000_s9334" name="Equation" r:id="rId4" imgW="2628720" imgH="457200" progId="Equation.DSMT4">
+                <p:oleObj spid="_x0000_s9349" name="Equation" r:id="rId4" imgW="2628720" imgH="457200" progId="Equation.DSMT4">
                   <p:embed/>
                 </p:oleObj>
               </mc:Choice>
@@ -7347,7 +7348,7 @@
           <a:graphicData uri="http://schemas.openxmlformats.org/presentationml/2006/ole">
             <mc:AlternateContent xmlns:mc="http://schemas.openxmlformats.org/markup-compatibility/2006">
               <mc:Choice xmlns:v="urn:schemas-microsoft-com:vml" Requires="v">
-                <p:oleObj spid="_x0000_s10358" name="Equation" r:id="rId4" imgW="2616120" imgH="457200" progId="Equation.DSMT4">
+                <p:oleObj spid="_x0000_s10373" name="Equation" r:id="rId4" imgW="2616120" imgH="457200" progId="Equation.DSMT4">
                   <p:embed/>
                 </p:oleObj>
               </mc:Choice>
@@ -8708,7 +8709,7 @@
           <a:graphicData uri="http://schemas.openxmlformats.org/presentationml/2006/ole">
             <mc:AlternateContent xmlns:mc="http://schemas.openxmlformats.org/markup-compatibility/2006">
               <mc:Choice xmlns:v="urn:schemas-microsoft-com:vml" Requires="v">
-                <p:oleObj spid="_x0000_s11563" name="Equation" r:id="rId4" imgW="190440" imgH="228600" progId="Equation.DSMT4">
+                <p:oleObj spid="_x0000_s11606" name="Equation" r:id="rId4" imgW="190440" imgH="228600" progId="Equation.DSMT4">
                   <p:embed/>
                 </p:oleObj>
               </mc:Choice>
@@ -8765,7 +8766,7 @@
           <a:graphicData uri="http://schemas.openxmlformats.org/presentationml/2006/ole">
             <mc:AlternateContent xmlns:mc="http://schemas.openxmlformats.org/markup-compatibility/2006">
               <mc:Choice xmlns:v="urn:schemas-microsoft-com:vml" Requires="v">
-                <p:oleObj spid="_x0000_s11564" name="Equation" r:id="rId6" imgW="228600" imgH="228600" progId="Equation.DSMT4">
+                <p:oleObj spid="_x0000_s11607" name="Equation" r:id="rId6" imgW="228600" imgH="228600" progId="Equation.DSMT4">
                   <p:embed/>
                 </p:oleObj>
               </mc:Choice>
@@ -8848,7 +8849,7 @@
           <a:graphicData uri="http://schemas.openxmlformats.org/presentationml/2006/ole">
             <mc:AlternateContent xmlns:mc="http://schemas.openxmlformats.org/markup-compatibility/2006">
               <mc:Choice xmlns:v="urn:schemas-microsoft-com:vml" Requires="v">
-                <p:oleObj spid="_x0000_s11565" name="Equation" r:id="rId8" imgW="1447560" imgH="457200" progId="Equation.DSMT4">
+                <p:oleObj spid="_x0000_s11608" name="Equation" r:id="rId8" imgW="1447560" imgH="457200" progId="Equation.DSMT4">
                   <p:embed/>
                 </p:oleObj>
               </mc:Choice>
@@ -10004,7 +10005,7 @@
           <a:graphicData uri="http://schemas.openxmlformats.org/presentationml/2006/ole">
             <mc:AlternateContent xmlns:mc="http://schemas.openxmlformats.org/markup-compatibility/2006">
               <mc:Choice xmlns:v="urn:schemas-microsoft-com:vml" Requires="v">
-                <p:oleObj spid="_x0000_s12389" name="Equation" r:id="rId4" imgW="431613" imgH="152334" progId="Equation.3">
+                <p:oleObj spid="_x0000_s12404" name="Equation" r:id="rId4" imgW="431613" imgH="152334" progId="Equation.3">
                   <p:embed/>
                 </p:oleObj>
               </mc:Choice>
@@ -12161,7 +12162,7 @@
           <a:graphicData uri="http://schemas.openxmlformats.org/presentationml/2006/ole">
             <mc:AlternateContent xmlns:mc="http://schemas.openxmlformats.org/markup-compatibility/2006">
               <mc:Choice xmlns:v="urn:schemas-microsoft-com:vml" Requires="v">
-                <p:oleObj spid="_x0000_s13413" name="Equation" r:id="rId4" imgW="177480" imgH="190440" progId="Equation.DSMT4">
+                <p:oleObj spid="_x0000_s13428" name="Equation" r:id="rId4" imgW="177480" imgH="190440" progId="Equation.DSMT4">
                   <p:embed/>
                 </p:oleObj>
               </mc:Choice>
@@ -12988,7 +12989,7 @@
           <a:graphicData uri="http://schemas.openxmlformats.org/presentationml/2006/ole">
             <mc:AlternateContent xmlns:mc="http://schemas.openxmlformats.org/markup-compatibility/2006">
               <mc:Choice xmlns:v="urn:schemas-microsoft-com:vml" Requires="v">
-                <p:oleObj spid="_x0000_s14437" name="Bitmap Image" r:id="rId4" imgW="4191585" imgH="1790476" progId="Paint.Picture">
+                <p:oleObj spid="_x0000_s14452" name="Bitmap Image" r:id="rId4" imgW="4191585" imgH="1790476" progId="Paint.Picture">
                   <p:embed/>
                 </p:oleObj>
               </mc:Choice>
@@ -13418,7 +13419,7 @@
           <a:graphicData uri="http://schemas.openxmlformats.org/presentationml/2006/ole">
             <mc:AlternateContent xmlns:mc="http://schemas.openxmlformats.org/markup-compatibility/2006">
               <mc:Choice xmlns:v="urn:schemas-microsoft-com:vml" Requires="v">
-                <p:oleObj spid="_x0000_s15461" name="Equation" r:id="rId4" imgW="3479760" imgH="457200" progId="Equation.DSMT4">
+                <p:oleObj spid="_x0000_s15476" name="Equation" r:id="rId4" imgW="3479760" imgH="457200" progId="Equation.DSMT4">
                   <p:embed/>
                 </p:oleObj>
               </mc:Choice>
@@ -14267,7 +14268,7 @@
                   <a:t>H0 : </a:t>
                 </a:r>
                 <a14:m>
-                  <m:oMath xmlns="" xmlns:m="http://schemas.openxmlformats.org/officeDocument/2006/math">
+                  <m:oMath xmlns:m="http://schemas.openxmlformats.org/officeDocument/2006/math" xmlns="">
                     <m:sSub>
                       <m:sSubPr>
                         <m:ctrlPr>
@@ -14313,7 +14314,7 @@
                   <a:t>H1 : </a:t>
                 </a:r>
                 <a14:m>
-                  <m:oMath xmlns="" xmlns:m="http://schemas.openxmlformats.org/officeDocument/2006/math">
+                  <m:oMath xmlns:m="http://schemas.openxmlformats.org/officeDocument/2006/math" xmlns="">
                     <m:sSub>
                       <m:sSubPr>
                         <m:ctrlPr>
@@ -14548,7 +14549,7 @@
           <a:graphicData uri="http://schemas.openxmlformats.org/presentationml/2006/ole">
             <mc:AlternateContent xmlns:mc="http://schemas.openxmlformats.org/markup-compatibility/2006">
               <mc:Choice xmlns:v="urn:schemas-microsoft-com:vml" Requires="v">
-                <p:oleObj spid="_x0000_s16447" name="Equation" r:id="rId5" imgW="139680" imgH="152280" progId="Equation.DSMT4">
+                <p:oleObj spid="_x0000_s16462" name="Equation" r:id="rId5" imgW="139680" imgH="152280" progId="Equation.DSMT4">
                   <p:embed/>
                 </p:oleObj>
               </mc:Choice>
@@ -15137,6 +15138,446 @@
 </p:sld>
 </file>
 
+<file path=ppt/slides/slide34.xml><?xml version="1.0" encoding="utf-8"?>
+<p:sld xmlns:a="http://schemas.openxmlformats.org/drawingml/2006/main" xmlns:r="http://schemas.openxmlformats.org/officeDocument/2006/relationships" xmlns:p="http://schemas.openxmlformats.org/presentationml/2006/main">
+  <p:cSld>
+    <p:spTree>
+      <p:nvGrpSpPr>
+        <p:cNvPr id="1" name=""/>
+        <p:cNvGrpSpPr/>
+        <p:nvPr/>
+      </p:nvGrpSpPr>
+      <p:grpSpPr>
+        <a:xfrm>
+          <a:off x="0" y="0"/>
+          <a:ext cx="0" cy="0"/>
+          <a:chOff x="0" y="0"/>
+          <a:chExt cx="0" cy="0"/>
+        </a:xfrm>
+      </p:grpSpPr>
+      <p:sp>
+        <p:nvSpPr>
+          <p:cNvPr id="3" name="Content Placeholder 2"/>
+          <p:cNvSpPr>
+            <a:spLocks noGrp="1"/>
+          </p:cNvSpPr>
+          <p:nvPr>
+            <p:ph idx="1"/>
+          </p:nvPr>
+        </p:nvSpPr>
+        <p:spPr>
+          <a:xfrm>
+            <a:off x="457200" y="304800"/>
+            <a:ext cx="8229600" cy="5821363"/>
+          </a:xfrm>
+        </p:spPr>
+        <p:txBody>
+          <a:bodyPr>
+            <a:normAutofit fontScale="32500" lnSpcReduction="20000"/>
+          </a:bodyPr>
+          <a:lstStyle/>
+          <a:p>
+            <a:r>
+              <a:rPr lang="en-US" sz="4500" dirty="0">
+                <a:latin typeface="Palatino Linotype" pitchFamily="18" charset="0"/>
+              </a:rPr>
+              <a:t>A researcher wants to know if the sentencing practices for first-time drug offenders in his county are different than sentencing practices in the state as a whole.  A recent news report indicates that the mean number of years to which first-time drug offenders in the state are sentenced is 12.16.  A sample of 25 court records from the researcher’s county indicates a mean number of years = 11.24, with a standard deviation of 3.11.  Test the null hypothesis at the .05 level of significance.</a:t>
+            </a:r>
+          </a:p>
+          <a:p>
+            <a:pPr marL="0" indent="0">
+              <a:buNone/>
+            </a:pPr>
+            <a:r>
+              <a:rPr lang="en-US" sz="4500" dirty="0">
+                <a:latin typeface="Palatino Linotype" pitchFamily="18" charset="0"/>
+              </a:rPr>
+              <a:t> </a:t>
+            </a:r>
+          </a:p>
+          <a:p>
+            <a:pPr marL="0" indent="0">
+              <a:buNone/>
+            </a:pPr>
+            <a:r>
+              <a:rPr lang="en-US" sz="4500" dirty="0">
+                <a:latin typeface="Palatino Linotype" pitchFamily="18" charset="0"/>
+              </a:rPr>
+              <a:t>For this scenario,</a:t>
+            </a:r>
+          </a:p>
+          <a:p>
+            <a:pPr marL="0" indent="0">
+              <a:buNone/>
+            </a:pPr>
+            <a:r>
+              <a:rPr lang="en-US" sz="4500" dirty="0">
+                <a:latin typeface="Palatino Linotype" pitchFamily="18" charset="0"/>
+              </a:rPr>
+              <a:t>H</a:t>
+            </a:r>
+            <a:r>
+              <a:rPr lang="en-US" sz="4500" baseline="-25000" dirty="0">
+                <a:latin typeface="Palatino Linotype" pitchFamily="18" charset="0"/>
+              </a:rPr>
+              <a:t>0</a:t>
+            </a:r>
+            <a:r>
+              <a:rPr lang="en-US" sz="4500" dirty="0">
+                <a:latin typeface="Palatino Linotype" pitchFamily="18" charset="0"/>
+              </a:rPr>
+              <a:t>:  The sample was selected from a population with µ = 12.16.</a:t>
+            </a:r>
+          </a:p>
+          <a:p>
+            <a:pPr marL="0" indent="0">
+              <a:buNone/>
+            </a:pPr>
+            <a:r>
+              <a:rPr lang="en-US" sz="4500" dirty="0">
+                <a:latin typeface="Palatino Linotype" pitchFamily="18" charset="0"/>
+              </a:rPr>
+              <a:t>H</a:t>
+            </a:r>
+            <a:r>
+              <a:rPr lang="en-US" sz="4500" baseline="-25000" dirty="0">
+                <a:latin typeface="Palatino Linotype" pitchFamily="18" charset="0"/>
+              </a:rPr>
+              <a:t>1</a:t>
+            </a:r>
+            <a:r>
+              <a:rPr lang="en-US" sz="4500" dirty="0">
+                <a:latin typeface="Palatino Linotype" pitchFamily="18" charset="0"/>
+              </a:rPr>
+              <a:t>:  The sample was selected from a population with µ ≠ 12.16.</a:t>
+            </a:r>
+          </a:p>
+          <a:p>
+            <a:pPr marL="0" indent="0">
+              <a:buNone/>
+            </a:pPr>
+            <a:r>
+              <a:rPr lang="en-US" sz="4500" dirty="0">
+                <a:latin typeface="Palatino Linotype" pitchFamily="18" charset="0"/>
+              </a:rPr>
+              <a:t> </a:t>
+            </a:r>
+          </a:p>
+          <a:p>
+            <a:pPr lvl="0"/>
+            <a:r>
+              <a:rPr lang="en-US" sz="4500" dirty="0">
+                <a:latin typeface="Palatino Linotype" pitchFamily="18" charset="0"/>
+              </a:rPr>
+              <a:t>(1 point)  What is/are the critical value(s) of t?</a:t>
+            </a:r>
+          </a:p>
+          <a:p>
+            <a:pPr marL="0" indent="0">
+              <a:buNone/>
+            </a:pPr>
+            <a:r>
+              <a:rPr lang="en-US" sz="4600" dirty="0">
+                <a:solidFill>
+                  <a:srgbClr val="0000FF"/>
+                </a:solidFill>
+              </a:rPr>
+              <a:t> </a:t>
+            </a:r>
+            <a:r>
+              <a:rPr lang="mr-IN" sz="4600" dirty="0">
+                <a:solidFill>
+                  <a:srgbClr val="0000FF"/>
+                </a:solidFill>
+              </a:rPr>
+              <a:t>&gt; qt(0.05,25-1)</a:t>
+            </a:r>
+          </a:p>
+          <a:p>
+            <a:pPr marL="0" indent="0">
+              <a:buNone/>
+            </a:pPr>
+            <a:r>
+              <a:rPr lang="mr-IN" sz="4600" dirty="0">
+                <a:solidFill>
+                  <a:srgbClr val="0000FF"/>
+                </a:solidFill>
+              </a:rPr>
+              <a:t>[1] -1.710882</a:t>
+            </a:r>
+            <a:endParaRPr lang="en-US" sz="4600" dirty="0">
+              <a:solidFill>
+                <a:srgbClr val="0000FF"/>
+              </a:solidFill>
+            </a:endParaRPr>
+          </a:p>
+          <a:p>
+            <a:pPr lvl="0"/>
+            <a:r>
+              <a:rPr lang="en-US" sz="4500" dirty="0">
+                <a:latin typeface="Palatino Linotype" pitchFamily="18" charset="0"/>
+              </a:rPr>
+              <a:t>(3 points)  Compute the observed value of t.</a:t>
+            </a:r>
+          </a:p>
+          <a:p>
+            <a:pPr marL="0" indent="0">
+              <a:buNone/>
+            </a:pPr>
+            <a:r>
+              <a:rPr lang="en-US" sz="4600" dirty="0">
+                <a:solidFill>
+                  <a:srgbClr val="0000FF"/>
+                </a:solidFill>
+              </a:rPr>
+              <a:t> </a:t>
+            </a:r>
+            <a:r>
+              <a:rPr lang="mr-IN" sz="4600" dirty="0">
+                <a:solidFill>
+                  <a:srgbClr val="0000FF"/>
+                </a:solidFill>
+              </a:rPr>
+              <a:t>&gt; tobs &lt;- (11.24-12.16)/(3.11/sqrt(25))</a:t>
+            </a:r>
+          </a:p>
+          <a:p>
+            <a:pPr marL="0" indent="0">
+              <a:buNone/>
+            </a:pPr>
+            <a:r>
+              <a:rPr lang="mr-IN" sz="4600" dirty="0">
+                <a:solidFill>
+                  <a:srgbClr val="0000FF"/>
+                </a:solidFill>
+              </a:rPr>
+              <a:t>&gt; tobs</a:t>
+            </a:r>
+          </a:p>
+          <a:p>
+            <a:pPr marL="0" indent="0">
+              <a:buNone/>
+            </a:pPr>
+            <a:r>
+              <a:rPr lang="mr-IN" sz="4600" dirty="0">
+                <a:solidFill>
+                  <a:srgbClr val="0000FF"/>
+                </a:solidFill>
+              </a:rPr>
+              <a:t>[1] -1.4791</a:t>
+            </a:r>
+            <a:endParaRPr lang="en-US" sz="4600" dirty="0">
+              <a:solidFill>
+                <a:srgbClr val="0000FF"/>
+              </a:solidFill>
+            </a:endParaRPr>
+          </a:p>
+          <a:p>
+            <a:pPr marL="0" indent="0">
+              <a:buNone/>
+            </a:pPr>
+            <a:r>
+              <a:rPr lang="en-US" sz="4500" dirty="0">
+                <a:latin typeface="Palatino Linotype" pitchFamily="18" charset="0"/>
+              </a:rPr>
+              <a:t> </a:t>
+            </a:r>
+          </a:p>
+          <a:p>
+            <a:pPr lvl="0"/>
+            <a:r>
+              <a:rPr lang="en-US" sz="4500" dirty="0">
+                <a:latin typeface="Palatino Linotype" pitchFamily="18" charset="0"/>
+              </a:rPr>
+              <a:t>(1 point)  Compare the observed value to the critical value(s) and state your decision regarding the null hypothesis.</a:t>
+            </a:r>
+          </a:p>
+          <a:p>
+            <a:pPr marL="0" indent="0">
+              <a:buNone/>
+            </a:pPr>
+            <a:r>
+              <a:rPr lang="en-US" altLang="zh-CN" sz="4600" dirty="0" smtClean="0">
+                <a:solidFill>
+                  <a:srgbClr val="0000FF"/>
+                </a:solidFill>
+              </a:rPr>
+              <a:t>|</a:t>
+            </a:r>
+            <a:r>
+              <a:rPr lang="en-US" altLang="zh-CN" sz="4600" dirty="0" err="1" smtClean="0">
+                <a:solidFill>
+                  <a:srgbClr val="0000FF"/>
+                </a:solidFill>
+              </a:rPr>
+              <a:t>t</a:t>
+            </a:r>
+            <a:r>
+              <a:rPr lang="en-US" sz="4600" dirty="0" err="1" smtClean="0">
+                <a:solidFill>
+                  <a:srgbClr val="0000FF"/>
+                </a:solidFill>
+              </a:rPr>
+              <a:t>obs</a:t>
+            </a:r>
+            <a:r>
+              <a:rPr lang="en-US" altLang="zh-CN" sz="4600" dirty="0" smtClean="0">
+                <a:solidFill>
+                  <a:srgbClr val="0000FF"/>
+                </a:solidFill>
+              </a:rPr>
+              <a:t>|</a:t>
+            </a:r>
+            <a:r>
+              <a:rPr lang="zh-CN" altLang="en-US" sz="4600" dirty="0" smtClean="0">
+                <a:solidFill>
+                  <a:srgbClr val="0000FF"/>
+                </a:solidFill>
+              </a:rPr>
+              <a:t> </a:t>
+            </a:r>
+            <a:r>
+              <a:rPr lang="en-US" altLang="zh-CN" sz="4600" dirty="0" smtClean="0">
+                <a:solidFill>
+                  <a:srgbClr val="0000FF"/>
+                </a:solidFill>
+              </a:rPr>
+              <a:t>&lt;|</a:t>
+            </a:r>
+            <a:r>
+              <a:rPr lang="en-US" altLang="zh-CN" sz="4600" dirty="0" err="1" smtClean="0">
+                <a:solidFill>
+                  <a:srgbClr val="0000FF"/>
+                </a:solidFill>
+              </a:rPr>
+              <a:t>tcritcal</a:t>
+            </a:r>
+            <a:r>
+              <a:rPr lang="en-US" altLang="zh-CN" sz="4600" dirty="0" smtClean="0">
+                <a:solidFill>
+                  <a:srgbClr val="0000FF"/>
+                </a:solidFill>
+              </a:rPr>
+              <a:t>|</a:t>
+            </a:r>
+            <a:r>
+              <a:rPr lang="zh-CN" altLang="en-US" sz="4600" dirty="0" smtClean="0">
+                <a:solidFill>
+                  <a:srgbClr val="0000FF"/>
+                </a:solidFill>
+              </a:rPr>
+              <a:t> </a:t>
+            </a:r>
+            <a:r>
+              <a:rPr lang="en-US" altLang="zh-CN" sz="4600" dirty="0" smtClean="0">
+                <a:solidFill>
+                  <a:srgbClr val="0000FF"/>
+                </a:solidFill>
+              </a:rPr>
+              <a:t>,</a:t>
+            </a:r>
+            <a:r>
+              <a:rPr lang="zh-CN" altLang="en-US" sz="4600" dirty="0" smtClean="0">
+                <a:solidFill>
+                  <a:srgbClr val="0000FF"/>
+                </a:solidFill>
+              </a:rPr>
+              <a:t> </a:t>
+            </a:r>
+            <a:r>
+              <a:rPr lang="en-US" altLang="zh-CN" sz="4600" dirty="0" smtClean="0">
+                <a:solidFill>
+                  <a:srgbClr val="0000FF"/>
+                </a:solidFill>
+              </a:rPr>
+              <a:t>thus,</a:t>
+            </a:r>
+            <a:r>
+              <a:rPr lang="zh-CN" altLang="en-US" sz="4600" dirty="0" smtClean="0">
+                <a:solidFill>
+                  <a:srgbClr val="0000FF"/>
+                </a:solidFill>
+              </a:rPr>
+              <a:t> </a:t>
+            </a:r>
+            <a:r>
+              <a:rPr lang="en-US" altLang="zh-CN" sz="4600" dirty="0" smtClean="0">
+                <a:solidFill>
+                  <a:srgbClr val="0000FF"/>
+                </a:solidFill>
+              </a:rPr>
+              <a:t>accept</a:t>
+            </a:r>
+            <a:r>
+              <a:rPr lang="zh-CN" altLang="en-US" sz="4600" dirty="0" smtClean="0">
+                <a:solidFill>
+                  <a:srgbClr val="0000FF"/>
+                </a:solidFill>
+              </a:rPr>
+              <a:t> </a:t>
+            </a:r>
+            <a:r>
+              <a:rPr lang="en-US" sz="4600" dirty="0">
+                <a:solidFill>
+                  <a:srgbClr val="0000FF"/>
+                </a:solidFill>
+                <a:latin typeface="Palatino Linotype" pitchFamily="18" charset="0"/>
+              </a:rPr>
+              <a:t>H</a:t>
+            </a:r>
+            <a:r>
+              <a:rPr lang="en-US" sz="4600" baseline="-25000" dirty="0">
+                <a:solidFill>
+                  <a:srgbClr val="0000FF"/>
+                </a:solidFill>
+                <a:latin typeface="Palatino Linotype" pitchFamily="18" charset="0"/>
+              </a:rPr>
+              <a:t>0</a:t>
+            </a:r>
+            <a:endParaRPr lang="en-US" sz="4600" dirty="0">
+              <a:solidFill>
+                <a:srgbClr val="0000FF"/>
+              </a:solidFill>
+            </a:endParaRPr>
+          </a:p>
+        </p:txBody>
+      </p:sp>
+      <p:sp>
+        <p:nvSpPr>
+          <p:cNvPr id="2" name="Slide Number Placeholder 1"/>
+          <p:cNvSpPr>
+            <a:spLocks noGrp="1"/>
+          </p:cNvSpPr>
+          <p:nvPr>
+            <p:ph type="sldNum" sz="quarter" idx="12"/>
+          </p:nvPr>
+        </p:nvSpPr>
+        <p:spPr/>
+        <p:txBody>
+          <a:bodyPr/>
+          <a:lstStyle/>
+          <a:p>
+            <a:fld id="{BAD1143D-68F3-4874-89B1-6CE0D4C12EB6}" type="slidenum">
+              <a:rPr lang="en-US" smtClean="0"/>
+              <a:t>34</a:t>
+            </a:fld>
+            <a:endParaRPr lang="en-US"/>
+          </a:p>
+        </p:txBody>
+      </p:sp>
+    </p:spTree>
+    <p:extLst>
+      <p:ext uri="{BB962C8B-B14F-4D97-AF65-F5344CB8AC3E}">
+        <p14:creationId xmlns:p14="http://schemas.microsoft.com/office/powerpoint/2010/main" val="593165216"/>
+      </p:ext>
+    </p:extLst>
+  </p:cSld>
+  <p:clrMapOvr>
+    <a:masterClrMapping/>
+  </p:clrMapOvr>
+</p:sld>
+</file>
+
 <file path=ppt/slides/slide4.xml><?xml version="1.0" encoding="utf-8"?>
 <p:sld xmlns:a="http://schemas.openxmlformats.org/drawingml/2006/main" xmlns:r="http://schemas.openxmlformats.org/officeDocument/2006/relationships" xmlns:p="http://schemas.openxmlformats.org/presentationml/2006/main">
   <p:cSld>
@@ -15918,7 +16359,7 @@
           <a:graphicData uri="http://schemas.openxmlformats.org/presentationml/2006/ole">
             <mc:AlternateContent xmlns:mc="http://schemas.openxmlformats.org/markup-compatibility/2006">
               <mc:Choice xmlns:v="urn:schemas-microsoft-com:vml" Requires="v">
-                <p:oleObj spid="_x0000_s4665" name="Equation" r:id="rId4" imgW="583947" imgH="241195" progId="Equation.3">
+                <p:oleObj spid="_x0000_s4736" name="Equation" r:id="rId4" imgW="583947" imgH="241195" progId="Equation.3">
                   <p:embed/>
                 </p:oleObj>
               </mc:Choice>
@@ -16044,7 +16485,7 @@
           <a:graphicData uri="http://schemas.openxmlformats.org/presentationml/2006/ole">
             <mc:AlternateContent xmlns:mc="http://schemas.openxmlformats.org/markup-compatibility/2006">
               <mc:Choice xmlns:v="urn:schemas-microsoft-com:vml" Requires="v">
-                <p:oleObj spid="_x0000_s4666" name="Equation" r:id="rId6" imgW="609480" imgH="419040" progId="Equation.DSMT4">
+                <p:oleObj spid="_x0000_s4737" name="Equation" r:id="rId6" imgW="609480" imgH="419040" progId="Equation.DSMT4">
                   <p:embed/>
                 </p:oleObj>
               </mc:Choice>
@@ -16101,7 +16542,7 @@
           <a:graphicData uri="http://schemas.openxmlformats.org/presentationml/2006/ole">
             <mc:AlternateContent xmlns:mc="http://schemas.openxmlformats.org/markup-compatibility/2006">
               <mc:Choice xmlns:v="urn:schemas-microsoft-com:vml" Requires="v">
-                <p:oleObj spid="_x0000_s4667" name="Equation" r:id="rId8" imgW="177480" imgH="190440" progId="Equation.DSMT4">
+                <p:oleObj spid="_x0000_s4738" name="Equation" r:id="rId8" imgW="177480" imgH="190440" progId="Equation.DSMT4">
                   <p:embed/>
                 </p:oleObj>
               </mc:Choice>
@@ -16158,7 +16599,7 @@
           <a:graphicData uri="http://schemas.openxmlformats.org/presentationml/2006/ole">
             <mc:AlternateContent xmlns:mc="http://schemas.openxmlformats.org/markup-compatibility/2006">
               <mc:Choice xmlns:v="urn:schemas-microsoft-com:vml" Requires="v">
-                <p:oleObj spid="_x0000_s4668" name="Equation" r:id="rId10" imgW="177480" imgH="190440" progId="Equation.DSMT4">
+                <p:oleObj spid="_x0000_s4739" name="Equation" r:id="rId10" imgW="177480" imgH="190440" progId="Equation.DSMT4">
                   <p:embed/>
                 </p:oleObj>
               </mc:Choice>
@@ -16215,7 +16656,7 @@
           <a:graphicData uri="http://schemas.openxmlformats.org/presentationml/2006/ole">
             <mc:AlternateContent xmlns:mc="http://schemas.openxmlformats.org/markup-compatibility/2006">
               <mc:Choice xmlns:v="urn:schemas-microsoft-com:vml" Requires="v">
-                <p:oleObj spid="_x0000_s4669" name="Equation" r:id="rId12" imgW="177480" imgH="190440" progId="Equation.DSMT4">
+                <p:oleObj spid="_x0000_s4740" name="Equation" r:id="rId12" imgW="177480" imgH="190440" progId="Equation.DSMT4">
                   <p:embed/>
                 </p:oleObj>
               </mc:Choice>
@@ -16690,7 +17131,7 @@
           <a:graphicData uri="http://schemas.openxmlformats.org/presentationml/2006/ole">
             <mc:AlternateContent xmlns:mc="http://schemas.openxmlformats.org/markup-compatibility/2006">
               <mc:Choice xmlns:v="urn:schemas-microsoft-com:vml" Requires="v">
-                <p:oleObj spid="_x0000_s5237" name="Equation" r:id="rId4" imgW="152280" imgH="139680" progId="Equation.DSMT4">
+                <p:oleObj spid="_x0000_s5252" name="Equation" r:id="rId4" imgW="152280" imgH="139680" progId="Equation.DSMT4">
                   <p:embed/>
                 </p:oleObj>
               </mc:Choice>
@@ -17097,7 +17538,7 @@
           <a:graphicData uri="http://schemas.openxmlformats.org/presentationml/2006/ole">
             <mc:AlternateContent xmlns:mc="http://schemas.openxmlformats.org/markup-compatibility/2006">
               <mc:Choice xmlns:v="urn:schemas-microsoft-com:vml" Requires="v">
-                <p:oleObj spid="_x0000_s6261" name="Equation" r:id="rId4" imgW="1473120" imgH="457200" progId="Equation.DSMT4">
+                <p:oleObj spid="_x0000_s6276" name="Equation" r:id="rId4" imgW="1473120" imgH="457200" progId="Equation.DSMT4">
                   <p:embed/>
                 </p:oleObj>
               </mc:Choice>
@@ -17613,14 +18054,14 @@
                 <a:gridCol w="1600200">
                   <a:extLst>
                     <a:ext uri="{9D8B030D-6E8A-4147-A177-3AD203B41FA5}">
-                      <a16:colId xmlns="" xmlns:a16="http://schemas.microsoft.com/office/drawing/2014/main" val="20000"/>
+                      <a16:colId xmlns:a16="http://schemas.microsoft.com/office/drawing/2014/main" xmlns="" val="20000"/>
                     </a:ext>
                   </a:extLst>
                 </a:gridCol>
                 <a:gridCol w="2971800">
                   <a:extLst>
                     <a:ext uri="{9D8B030D-6E8A-4147-A177-3AD203B41FA5}">
-                      <a16:colId xmlns="" xmlns:a16="http://schemas.microsoft.com/office/drawing/2014/main" val="20001"/>
+                      <a16:colId xmlns:a16="http://schemas.microsoft.com/office/drawing/2014/main" xmlns="" val="20001"/>
                     </a:ext>
                   </a:extLst>
                 </a:gridCol>
@@ -17667,7 +18108,7 @@
                 </a:tc>
                 <a:extLst>
                   <a:ext uri="{0D108BD9-81ED-4DB2-BD59-A6C34878D82A}">
-                    <a16:rowId xmlns="" xmlns:a16="http://schemas.microsoft.com/office/drawing/2014/main" val="10000"/>
+                    <a16:rowId xmlns:a16="http://schemas.microsoft.com/office/drawing/2014/main" xmlns="" val="10000"/>
                   </a:ext>
                 </a:extLst>
               </a:tr>
@@ -17704,7 +18145,7 @@
                 </a:tc>
                 <a:extLst>
                   <a:ext uri="{0D108BD9-81ED-4DB2-BD59-A6C34878D82A}">
-                    <a16:rowId xmlns="" xmlns:a16="http://schemas.microsoft.com/office/drawing/2014/main" val="10001"/>
+                    <a16:rowId xmlns:a16="http://schemas.microsoft.com/office/drawing/2014/main" xmlns="" val="10001"/>
                   </a:ext>
                 </a:extLst>
               </a:tr>
@@ -17741,7 +18182,7 @@
                 </a:tc>
                 <a:extLst>
                   <a:ext uri="{0D108BD9-81ED-4DB2-BD59-A6C34878D82A}">
-                    <a16:rowId xmlns="" xmlns:a16="http://schemas.microsoft.com/office/drawing/2014/main" val="10002"/>
+                    <a16:rowId xmlns:a16="http://schemas.microsoft.com/office/drawing/2014/main" xmlns="" val="10002"/>
                   </a:ext>
                 </a:extLst>
               </a:tr>
@@ -17778,7 +18219,7 @@
                 </a:tc>
                 <a:extLst>
                   <a:ext uri="{0D108BD9-81ED-4DB2-BD59-A6C34878D82A}">
-                    <a16:rowId xmlns="" xmlns:a16="http://schemas.microsoft.com/office/drawing/2014/main" val="10003"/>
+                    <a16:rowId xmlns:a16="http://schemas.microsoft.com/office/drawing/2014/main" xmlns="" val="10003"/>
                   </a:ext>
                 </a:extLst>
               </a:tr>
@@ -17815,7 +18256,7 @@
                 </a:tc>
                 <a:extLst>
                   <a:ext uri="{0D108BD9-81ED-4DB2-BD59-A6C34878D82A}">
-                    <a16:rowId xmlns="" xmlns:a16="http://schemas.microsoft.com/office/drawing/2014/main" val="10004"/>
+                    <a16:rowId xmlns:a16="http://schemas.microsoft.com/office/drawing/2014/main" xmlns="" val="10004"/>
                   </a:ext>
                 </a:extLst>
               </a:tr>
@@ -17843,6 +18284,78 @@
               <a:t>7</a:t>
             </a:fld>
             <a:endParaRPr lang="en-US"/>
+          </a:p>
+        </p:txBody>
+      </p:sp>
+      <p:sp>
+        <p:nvSpPr>
+          <p:cNvPr id="4" name="TextBox 3"/>
+          <p:cNvSpPr txBox="1"/>
+          <p:nvPr/>
+        </p:nvSpPr>
+        <p:spPr>
+          <a:xfrm>
+            <a:off x="6248400" y="2209800"/>
+            <a:ext cx="2438400" cy="2308324"/>
+          </a:xfrm>
+          <a:prstGeom prst="rect">
+            <a:avLst/>
+          </a:prstGeom>
+          <a:noFill/>
+        </p:spPr>
+        <p:txBody>
+          <a:bodyPr wrap="square" rtlCol="0">
+            <a:spAutoFit/>
+          </a:bodyPr>
+          <a:lstStyle/>
+          <a:p>
+            <a:r>
+              <a:rPr lang="mr-IN" dirty="0"/>
+              <a:t>&gt; pnorm(1.645)</a:t>
+            </a:r>
+          </a:p>
+          <a:p>
+            <a:r>
+              <a:rPr lang="mr-IN" dirty="0"/>
+              <a:t>[1] 0.9500151</a:t>
+            </a:r>
+          </a:p>
+          <a:p>
+            <a:r>
+              <a:rPr lang="mr-IN" dirty="0"/>
+              <a:t>&gt; pnorm(1.96)</a:t>
+            </a:r>
+          </a:p>
+          <a:p>
+            <a:r>
+              <a:rPr lang="mr-IN" dirty="0"/>
+              <a:t>[1] 0.9750021</a:t>
+            </a:r>
+          </a:p>
+          <a:p>
+            <a:r>
+              <a:rPr lang="mr-IN" dirty="0"/>
+              <a:t>&gt; pnorm(2.33)</a:t>
+            </a:r>
+          </a:p>
+          <a:p>
+            <a:r>
+              <a:rPr lang="mr-IN" dirty="0"/>
+              <a:t>[1] 0.9900969</a:t>
+            </a:r>
+          </a:p>
+          <a:p>
+            <a:r>
+              <a:rPr lang="mr-IN" dirty="0"/>
+              <a:t>&gt; pnorm(2.58)</a:t>
+            </a:r>
+          </a:p>
+          <a:p>
+            <a:r>
+              <a:rPr lang="mr-IN" dirty="0"/>
+              <a:t>[1] 0.99506</a:t>
+            </a:r>
+            <a:endParaRPr lang="en-US" dirty="0"/>
           </a:p>
         </p:txBody>
       </p:sp>
@@ -18330,7 +18843,7 @@
           <a:graphicData uri="http://schemas.openxmlformats.org/presentationml/2006/ole">
             <mc:AlternateContent xmlns:mc="http://schemas.openxmlformats.org/markup-compatibility/2006">
               <mc:Choice xmlns:v="urn:schemas-microsoft-com:vml" Requires="v">
-                <p:oleObj spid="_x0000_s8309" name="Bitmap Image" r:id="rId4" imgW="4552381" imgH="2057143" progId="Paint.Picture">
+                <p:oleObj spid="_x0000_s8324" name="Bitmap Image" r:id="rId4" imgW="4552381" imgH="2057143" progId="Paint.Picture">
                   <p:embed/>
                 </p:oleObj>
               </mc:Choice>

</xml_diff>